<commit_message>
#4 - [Agalya] - Added slides about social networks and ranking
</commit_message>
<xml_diff>
--- a/Group3Presentation.pptx
+++ b/Group3Presentation.pptx
@@ -12,6 +12,7 @@
     <p:sldId id="260" r:id="rId6"/>
     <p:sldId id="261" r:id="rId7"/>
     <p:sldId id="262" r:id="rId8"/>
+    <p:sldId id="263" r:id="rId9"/>
   </p:sldIdLst>
   <p:sldSz cx="12192000" cy="6858000"/>
   <p:notesSz cx="6858000" cy="9144000"/>
@@ -110,6 +111,11 @@
       </a:defRPr>
     </a:lvl9pPr>
   </p:defaultTextStyle>
+  <p:extLst>
+    <p:ext uri="{EFAFB233-063F-42B5-8137-9DF3F51BA10A}">
+      <p15:sldGuideLst xmlns:p15="http://schemas.microsoft.com/office/powerpoint/2012/main"/>
+    </p:ext>
+  </p:extLst>
 </p:presentation>
 </file>
 
@@ -304,7 +310,7 @@
           <a:p>
             <a:fld id="{44B4CD72-B659-40E6-A9DE-931DB2CE905D}" type="datetimeFigureOut">
               <a:rPr lang="en-US" smtClean="0"/>
-              <a:t>9/29/2015</a:t>
+              <a:t>9/30/15</a:t>
             </a:fld>
             <a:endParaRPr lang="en-US"/>
           </a:p>
@@ -740,7 +746,7 @@
           <a:p>
             <a:fld id="{44B4CD72-B659-40E6-A9DE-931DB2CE905D}" type="datetimeFigureOut">
               <a:rPr lang="en-US" smtClean="0"/>
-              <a:t>9/29/2015</a:t>
+              <a:t>9/30/15</a:t>
             </a:fld>
             <a:endParaRPr lang="en-US"/>
           </a:p>
@@ -990,7 +996,7 @@
           <a:p>
             <a:fld id="{44B4CD72-B659-40E6-A9DE-931DB2CE905D}" type="datetimeFigureOut">
               <a:rPr lang="en-US" smtClean="0"/>
-              <a:t>9/29/2015</a:t>
+              <a:t>9/30/15</a:t>
             </a:fld>
             <a:endParaRPr lang="en-US"/>
           </a:p>
@@ -1298,7 +1304,7 @@
           <a:p>
             <a:fld id="{44B4CD72-B659-40E6-A9DE-931DB2CE905D}" type="datetimeFigureOut">
               <a:rPr lang="en-US" smtClean="0"/>
-              <a:t>9/29/2015</a:t>
+              <a:t>9/30/15</a:t>
             </a:fld>
             <a:endParaRPr lang="en-US"/>
           </a:p>
@@ -1616,7 +1622,7 @@
           <a:p>
             <a:fld id="{44B4CD72-B659-40E6-A9DE-931DB2CE905D}" type="datetimeFigureOut">
               <a:rPr lang="en-US" smtClean="0"/>
-              <a:t>9/29/2015</a:t>
+              <a:t>9/30/15</a:t>
             </a:fld>
             <a:endParaRPr lang="en-US"/>
           </a:p>
@@ -1918,7 +1924,7 @@
           <a:p>
             <a:fld id="{44B4CD72-B659-40E6-A9DE-931DB2CE905D}" type="datetimeFigureOut">
               <a:rPr lang="en-US" smtClean="0"/>
-              <a:t>9/29/2015</a:t>
+              <a:t>9/30/15</a:t>
             </a:fld>
             <a:endParaRPr lang="en-US"/>
           </a:p>
@@ -2285,7 +2291,7 @@
           <a:p>
             <a:fld id="{44B4CD72-B659-40E6-A9DE-931DB2CE905D}" type="datetimeFigureOut">
               <a:rPr lang="en-US" smtClean="0"/>
-              <a:t>9/29/2015</a:t>
+              <a:t>9/30/15</a:t>
             </a:fld>
             <a:endParaRPr lang="en-US"/>
           </a:p>
@@ -2459,7 +2465,7 @@
           <a:p>
             <a:fld id="{44B4CD72-B659-40E6-A9DE-931DB2CE905D}" type="datetimeFigureOut">
               <a:rPr lang="en-US" smtClean="0"/>
-              <a:t>9/29/2015</a:t>
+              <a:t>9/30/15</a:t>
             </a:fld>
             <a:endParaRPr lang="en-US"/>
           </a:p>
@@ -2639,7 +2645,7 @@
           <a:p>
             <a:fld id="{44B4CD72-B659-40E6-A9DE-931DB2CE905D}" type="datetimeFigureOut">
               <a:rPr lang="en-US" smtClean="0"/>
-              <a:t>9/29/2015</a:t>
+              <a:t>9/30/15</a:t>
             </a:fld>
             <a:endParaRPr lang="en-US"/>
           </a:p>
@@ -2809,7 +2815,7 @@
           <a:p>
             <a:fld id="{44B4CD72-B659-40E6-A9DE-931DB2CE905D}" type="datetimeFigureOut">
               <a:rPr lang="en-US" smtClean="0"/>
-              <a:t>9/29/2015</a:t>
+              <a:t>9/30/15</a:t>
             </a:fld>
             <a:endParaRPr lang="en-US"/>
           </a:p>
@@ -3059,7 +3065,7 @@
           <a:p>
             <a:fld id="{44B4CD72-B659-40E6-A9DE-931DB2CE905D}" type="datetimeFigureOut">
               <a:rPr lang="en-US" smtClean="0"/>
-              <a:t>9/29/2015</a:t>
+              <a:t>9/30/15</a:t>
             </a:fld>
             <a:endParaRPr lang="en-US"/>
           </a:p>
@@ -3295,7 +3301,7 @@
           <a:p>
             <a:fld id="{44B4CD72-B659-40E6-A9DE-931DB2CE905D}" type="datetimeFigureOut">
               <a:rPr lang="en-US" smtClean="0"/>
-              <a:t>9/29/2015</a:t>
+              <a:t>9/30/15</a:t>
             </a:fld>
             <a:endParaRPr lang="en-US"/>
           </a:p>
@@ -3677,7 +3683,7 @@
           <a:p>
             <a:fld id="{44B4CD72-B659-40E6-A9DE-931DB2CE905D}" type="datetimeFigureOut">
               <a:rPr lang="en-US" smtClean="0"/>
-              <a:t>9/29/2015</a:t>
+              <a:t>9/30/15</a:t>
             </a:fld>
             <a:endParaRPr lang="en-US"/>
           </a:p>
@@ -3795,7 +3801,7 @@
           <a:p>
             <a:fld id="{44B4CD72-B659-40E6-A9DE-931DB2CE905D}" type="datetimeFigureOut">
               <a:rPr lang="en-US" smtClean="0"/>
-              <a:t>9/29/2015</a:t>
+              <a:t>9/30/15</a:t>
             </a:fld>
             <a:endParaRPr lang="en-US"/>
           </a:p>
@@ -3890,7 +3896,7 @@
           <a:p>
             <a:fld id="{44B4CD72-B659-40E6-A9DE-931DB2CE905D}" type="datetimeFigureOut">
               <a:rPr lang="en-US" smtClean="0"/>
-              <a:t>9/29/2015</a:t>
+              <a:t>9/30/15</a:t>
             </a:fld>
             <a:endParaRPr lang="en-US"/>
           </a:p>
@@ -4145,7 +4151,7 @@
           <a:p>
             <a:fld id="{44B4CD72-B659-40E6-A9DE-931DB2CE905D}" type="datetimeFigureOut">
               <a:rPr lang="en-US" smtClean="0"/>
-              <a:t>9/29/2015</a:t>
+              <a:t>9/30/15</a:t>
             </a:fld>
             <a:endParaRPr lang="en-US"/>
           </a:p>
@@ -4428,7 +4434,7 @@
           <a:p>
             <a:fld id="{44B4CD72-B659-40E6-A9DE-931DB2CE905D}" type="datetimeFigureOut">
               <a:rPr lang="en-US" smtClean="0"/>
-              <a:t>9/29/2015</a:t>
+              <a:t>9/30/15</a:t>
             </a:fld>
             <a:endParaRPr lang="en-US"/>
           </a:p>
@@ -4834,7 +4840,7 @@
           <a:p>
             <a:fld id="{44B4CD72-B659-40E6-A9DE-931DB2CE905D}" type="datetimeFigureOut">
               <a:rPr lang="en-US" smtClean="0"/>
-              <a:t>9/29/2015</a:t>
+              <a:t>9/30/15</a:t>
             </a:fld>
             <a:endParaRPr lang="en-US"/>
           </a:p>
@@ -5437,7 +5443,15 @@
           <a:p>
             <a:r>
               <a:rPr lang="en-US" dirty="0" err="1" smtClean="0"/>
-              <a:t>Aagalya</a:t>
+              <a:t>Agalya</a:t>
+            </a:r>
+            <a:r>
+              <a:rPr lang="en-US" dirty="0" smtClean="0"/>
+              <a:t> </a:t>
+            </a:r>
+            <a:r>
+              <a:rPr lang="en-US" dirty="0" err="1" smtClean="0"/>
+              <a:t>Loganathan</a:t>
             </a:r>
             <a:endParaRPr lang="en-US" dirty="0" smtClean="0"/>
           </a:p>
@@ -6188,15 +6202,145 @@
         </p:nvSpPr>
         <p:spPr>
           <a:xfrm>
-            <a:off x="684212" y="1479645"/>
-            <a:ext cx="9155824" cy="3501788"/>
+            <a:off x="684211" y="1479644"/>
+            <a:ext cx="9163173" cy="4639801"/>
           </a:xfrm>
         </p:spPr>
         <p:txBody>
-          <a:bodyPr/>
-          <a:lstStyle/>
-          <a:p>
-            <a:endParaRPr lang="en-US"/>
+          <a:bodyPr>
+            <a:normAutofit/>
+          </a:bodyPr>
+          <a:lstStyle/>
+          <a:p>
+            <a:pPr marL="285750" indent="-285750">
+              <a:buFontTx/>
+              <a:buChar char="-"/>
+            </a:pPr>
+            <a:r>
+              <a:rPr lang="en-US" dirty="0" smtClean="0"/>
+              <a:t>Scrapped </a:t>
+            </a:r>
+            <a:r>
+              <a:rPr lang="en-US" dirty="0"/>
+              <a:t>twitter (using the rest end points exposed) to fetch users and their friends in a breadth first fashion.	</a:t>
+            </a:r>
+            <a:r>
+              <a:rPr lang="en-US" dirty="0" smtClean="0"/>
+              <a:t>-</a:t>
+            </a:r>
+          </a:p>
+          <a:p>
+            <a:pPr marL="285750" indent="-285750">
+              <a:buFontTx/>
+              <a:buChar char="-"/>
+            </a:pPr>
+            <a:r>
+              <a:rPr lang="en-US" dirty="0" smtClean="0"/>
+              <a:t> </a:t>
+            </a:r>
+            <a:r>
+              <a:rPr lang="en-US" dirty="0"/>
+              <a:t>The user information collected is stored(persistent) in a no-</a:t>
+            </a:r>
+            <a:r>
+              <a:rPr lang="en-US" dirty="0" err="1"/>
+              <a:t>sql</a:t>
+            </a:r>
+            <a:r>
+              <a:rPr lang="en-US" dirty="0"/>
+              <a:t> </a:t>
+            </a:r>
+            <a:r>
+              <a:rPr lang="en-US" dirty="0" smtClean="0"/>
+              <a:t>database.</a:t>
+            </a:r>
+            <a:r>
+              <a:rPr lang="en-US" dirty="0"/>
+              <a:t>	</a:t>
+            </a:r>
+            <a:endParaRPr lang="en-US" dirty="0" smtClean="0"/>
+          </a:p>
+          <a:p>
+            <a:pPr marL="285750" indent="-285750">
+              <a:buFontTx/>
+              <a:buChar char="-"/>
+            </a:pPr>
+            <a:r>
+              <a:rPr lang="en-US" dirty="0" smtClean="0"/>
+              <a:t> </a:t>
+            </a:r>
+            <a:r>
+              <a:rPr lang="en-US" dirty="0"/>
+              <a:t>This user information (including friendship) is used to construct a social network </a:t>
+            </a:r>
+            <a:r>
+              <a:rPr lang="en-US" dirty="0" smtClean="0"/>
+              <a:t>graph. </a:t>
+            </a:r>
+          </a:p>
+          <a:p>
+            <a:pPr marL="285750" indent="-285750">
+              <a:buFontTx/>
+              <a:buChar char="-"/>
+            </a:pPr>
+            <a:r>
+              <a:rPr lang="en-US" dirty="0" smtClean="0"/>
+              <a:t>Few </a:t>
+            </a:r>
+            <a:r>
+              <a:rPr lang="en-US" dirty="0"/>
+              <a:t>measures like centrality and similarity are computed to get a picture of the social network constructed.	</a:t>
+            </a:r>
+            <a:endParaRPr lang="en-US" dirty="0" smtClean="0"/>
+          </a:p>
+          <a:p>
+            <a:pPr marL="285750" indent="-285750">
+              <a:buFontTx/>
+              <a:buChar char="-"/>
+            </a:pPr>
+            <a:r>
+              <a:rPr lang="en-US" dirty="0" smtClean="0"/>
+              <a:t>As </a:t>
+            </a:r>
+            <a:r>
+              <a:rPr lang="en-US" dirty="0"/>
+              <a:t>expected, there are many users with minimal friends and a few users with maximum friends. So we are handling both the cases differently when </a:t>
+            </a:r>
+            <a:r>
+              <a:rPr lang="en-US" dirty="0" smtClean="0"/>
+              <a:t>analyzed </a:t>
+            </a:r>
+            <a:r>
+              <a:rPr lang="en-US" dirty="0"/>
+              <a:t>in the ranking algorithm section</a:t>
+            </a:r>
+            <a:r>
+              <a:rPr lang="en-US" dirty="0" smtClean="0"/>
+              <a:t>.</a:t>
+            </a:r>
+          </a:p>
+          <a:p>
+            <a:pPr marL="285750" indent="-285750">
+              <a:buFontTx/>
+              <a:buChar char="-"/>
+            </a:pPr>
+            <a:r>
+              <a:rPr lang="en-US" dirty="0" smtClean="0"/>
+              <a:t>On </a:t>
+            </a:r>
+            <a:r>
+              <a:rPr lang="en-US" dirty="0"/>
+              <a:t>a side note, visualizations have also been done for the social network constructed (around 50K edges) using D3, </a:t>
+            </a:r>
+            <a:r>
+              <a:rPr lang="en-US" dirty="0" err="1"/>
+              <a:t>matplotlib</a:t>
+            </a:r>
+            <a:r>
+              <a:rPr lang="en-US" dirty="0"/>
+              <a:t>. </a:t>
+            </a:r>
+            <a:endParaRPr lang="en-US" dirty="0"/>
           </a:p>
         </p:txBody>
       </p:sp>
@@ -6217,6 +6361,163 @@
       </p:par>
     </p:tnLst>
   </p:timing>
+</p:sld>
+</file>
+
+<file path=ppt/slides/slide8.xml><?xml version="1.0" encoding="utf-8"?>
+<p:sld xmlns:a="http://schemas.openxmlformats.org/drawingml/2006/main" xmlns:r="http://schemas.openxmlformats.org/officeDocument/2006/relationships" xmlns:p="http://schemas.openxmlformats.org/presentationml/2006/main">
+  <p:cSld>
+    <p:spTree>
+      <p:nvGrpSpPr>
+        <p:cNvPr id="1" name=""/>
+        <p:cNvGrpSpPr/>
+        <p:nvPr/>
+      </p:nvGrpSpPr>
+      <p:grpSpPr>
+        <a:xfrm>
+          <a:off x="0" y="0"/>
+          <a:ext cx="0" cy="0"/>
+          <a:chOff x="0" y="0"/>
+          <a:chExt cx="0" cy="0"/>
+        </a:xfrm>
+      </p:grpSpPr>
+      <p:sp>
+        <p:nvSpPr>
+          <p:cNvPr id="2" name="Title 1"/>
+          <p:cNvSpPr>
+            <a:spLocks noGrp="1"/>
+          </p:cNvSpPr>
+          <p:nvPr>
+            <p:ph type="title"/>
+          </p:nvPr>
+        </p:nvSpPr>
+        <p:spPr>
+          <a:xfrm>
+            <a:off x="684211" y="450166"/>
+            <a:ext cx="11188921" cy="1111348"/>
+          </a:xfrm>
+        </p:spPr>
+        <p:txBody>
+          <a:bodyPr>
+            <a:normAutofit fontScale="90000"/>
+          </a:bodyPr>
+          <a:lstStyle/>
+          <a:p>
+            <a:r>
+              <a:rPr lang="en-US" dirty="0" smtClean="0"/>
+              <a:t>USING SOCIAL NETWORKS TO RANK THE LOCATION PREDICTION</a:t>
+            </a:r>
+            <a:endParaRPr lang="en-US" dirty="0"/>
+          </a:p>
+        </p:txBody>
+      </p:sp>
+      <p:sp>
+        <p:nvSpPr>
+          <p:cNvPr id="3" name="Text Placeholder 2"/>
+          <p:cNvSpPr>
+            <a:spLocks noGrp="1"/>
+          </p:cNvSpPr>
+          <p:nvPr>
+            <p:ph type="body" idx="1"/>
+          </p:nvPr>
+        </p:nvSpPr>
+        <p:spPr>
+          <a:xfrm>
+            <a:off x="782686" y="1752599"/>
+            <a:ext cx="9669609" cy="2805333"/>
+          </a:xfrm>
+        </p:spPr>
+        <p:txBody>
+          <a:bodyPr/>
+          <a:lstStyle/>
+          <a:p>
+            <a:pPr marL="285750" indent="-285750">
+              <a:buFontTx/>
+              <a:buChar char="-"/>
+            </a:pPr>
+            <a:r>
+              <a:rPr lang="en-US" dirty="0" smtClean="0"/>
+              <a:t>Use </a:t>
+            </a:r>
+            <a:r>
+              <a:rPr lang="en-US" dirty="0"/>
+              <a:t>social tightness model to predict similarity between </a:t>
+            </a:r>
+            <a:r>
+              <a:rPr lang="en-US" dirty="0" smtClean="0"/>
+              <a:t>users</a:t>
+            </a:r>
+          </a:p>
+          <a:p>
+            <a:pPr marL="285750" indent="-285750">
+              <a:buFontTx/>
+              <a:buChar char="-"/>
+            </a:pPr>
+            <a:r>
+              <a:rPr lang="en-US" dirty="0" smtClean="0"/>
+              <a:t>Identify the most influential (similar) friends of a user and extract their location (if available in user profile information)</a:t>
+            </a:r>
+          </a:p>
+          <a:p>
+            <a:pPr marL="285750" indent="-285750">
+              <a:buFontTx/>
+              <a:buChar char="-"/>
+            </a:pPr>
+            <a:r>
+              <a:rPr lang="en-US" dirty="0" smtClean="0"/>
+              <a:t>If location information is not available</a:t>
+            </a:r>
+            <a:r>
+              <a:rPr lang="en-US" dirty="0"/>
+              <a:t>,  </a:t>
+            </a:r>
+            <a:r>
+              <a:rPr lang="en-US" dirty="0" smtClean="0"/>
+              <a:t>estimate the </a:t>
+            </a:r>
+            <a:r>
+              <a:rPr lang="en-US" dirty="0"/>
+              <a:t>user's location and use this estimate in successive iterations </a:t>
+            </a:r>
+            <a:endParaRPr lang="en-US" dirty="0" smtClean="0"/>
+          </a:p>
+          <a:p>
+            <a:pPr marL="285750" indent="-285750">
+              <a:buFontTx/>
+              <a:buChar char="-"/>
+            </a:pPr>
+            <a:r>
+              <a:rPr lang="en-US" dirty="0"/>
+              <a:t>identify </a:t>
+            </a:r>
+            <a:r>
+              <a:rPr lang="en-US" dirty="0" smtClean="0"/>
+              <a:t>(influential) friends </a:t>
+            </a:r>
+            <a:r>
+              <a:rPr lang="en-US" dirty="0"/>
+              <a:t>whose location estimations are closer to the user's predicted </a:t>
+            </a:r>
+            <a:r>
+              <a:rPr lang="en-US" dirty="0" smtClean="0"/>
+              <a:t>location</a:t>
+            </a:r>
+          </a:p>
+          <a:p>
+            <a:endParaRPr lang="en-US" dirty="0"/>
+          </a:p>
+        </p:txBody>
+      </p:sp>
+    </p:spTree>
+    <p:extLst>
+      <p:ext uri="{BB962C8B-B14F-4D97-AF65-F5344CB8AC3E}">
+        <p14:creationId xmlns:p14="http://schemas.microsoft.com/office/powerpoint/2010/main" val="1702204155"/>
+      </p:ext>
+    </p:extLst>
+  </p:cSld>
+  <p:clrMapOvr>
+    <a:masterClrMapping/>
+  </p:clrMapOvr>
 </p:sld>
 </file>
 

</xml_diff>